<commit_message>
UPDATE removendo a nossa rede da apresentação
</commit_message>
<xml_diff>
--- a/Apresentação/Apresentação.pptx
+++ b/Apresentação/Apresentação.pptx
@@ -626,7 +626,7 @@
           <a:p>
             <a:fld id="{DA392747-C1F4-424F-BAB1-CC63944BFCAA}" type="datetimeFigureOut">
               <a:rPr lang="en-US" smtClean="0"/>
-              <a:t>6/14/20</a:t>
+              <a:t>6/15/20</a:t>
             </a:fld>
             <a:endParaRPr lang="en-US"/>
           </a:p>
@@ -922,7 +922,7 @@
           <a:p>
             <a:fld id="{DA392747-C1F4-424F-BAB1-CC63944BFCAA}" type="datetimeFigureOut">
               <a:rPr lang="en-US" smtClean="0"/>
-              <a:t>6/14/20</a:t>
+              <a:t>6/15/20</a:t>
             </a:fld>
             <a:endParaRPr lang="en-US"/>
           </a:p>
@@ -1170,7 +1170,7 @@
           <a:p>
             <a:fld id="{DA392747-C1F4-424F-BAB1-CC63944BFCAA}" type="datetimeFigureOut">
               <a:rPr lang="en-US" smtClean="0"/>
-              <a:t>6/14/20</a:t>
+              <a:t>6/15/20</a:t>
             </a:fld>
             <a:endParaRPr lang="en-US"/>
           </a:p>
@@ -1710,7 +1710,7 @@
           <a:p>
             <a:fld id="{DA392747-C1F4-424F-BAB1-CC63944BFCAA}" type="datetimeFigureOut">
               <a:rPr lang="en-US" smtClean="0"/>
-              <a:t>6/14/20</a:t>
+              <a:t>6/15/20</a:t>
             </a:fld>
             <a:endParaRPr lang="en-US"/>
           </a:p>
@@ -1958,7 +1958,7 @@
           <a:p>
             <a:fld id="{DA392747-C1F4-424F-BAB1-CC63944BFCAA}" type="datetimeFigureOut">
               <a:rPr lang="en-US" smtClean="0"/>
-              <a:t>6/14/20</a:t>
+              <a:t>6/15/20</a:t>
             </a:fld>
             <a:endParaRPr lang="en-US"/>
           </a:p>
@@ -2490,7 +2490,7 @@
           <a:p>
             <a:fld id="{DA392747-C1F4-424F-BAB1-CC63944BFCAA}" type="datetimeFigureOut">
               <a:rPr lang="en-US" smtClean="0"/>
-              <a:t>6/14/20</a:t>
+              <a:t>6/15/20</a:t>
             </a:fld>
             <a:endParaRPr lang="en-US"/>
           </a:p>
@@ -2787,7 +2787,7 @@
           <a:p>
             <a:fld id="{DA392747-C1F4-424F-BAB1-CC63944BFCAA}" type="datetimeFigureOut">
               <a:rPr lang="en-US" smtClean="0"/>
-              <a:t>6/14/20</a:t>
+              <a:t>6/15/20</a:t>
             </a:fld>
             <a:endParaRPr lang="en-US"/>
           </a:p>
@@ -2961,7 +2961,7 @@
           <a:p>
             <a:fld id="{DA392747-C1F4-424F-BAB1-CC63944BFCAA}" type="datetimeFigureOut">
               <a:rPr lang="en-US" smtClean="0"/>
-              <a:t>6/14/20</a:t>
+              <a:t>6/15/20</a:t>
             </a:fld>
             <a:endParaRPr lang="en-US"/>
           </a:p>
@@ -3141,7 +3141,7 @@
           <a:p>
             <a:fld id="{DA392747-C1F4-424F-BAB1-CC63944BFCAA}" type="datetimeFigureOut">
               <a:rPr lang="en-US" smtClean="0"/>
-              <a:t>6/14/20</a:t>
+              <a:t>6/15/20</a:t>
             </a:fld>
             <a:endParaRPr lang="en-US"/>
           </a:p>
@@ -3311,7 +3311,7 @@
           <a:p>
             <a:fld id="{DA392747-C1F4-424F-BAB1-CC63944BFCAA}" type="datetimeFigureOut">
               <a:rPr lang="en-US" smtClean="0"/>
-              <a:t>6/14/20</a:t>
+              <a:t>6/15/20</a:t>
             </a:fld>
             <a:endParaRPr lang="en-US"/>
           </a:p>
@@ -3561,7 +3561,7 @@
           <a:p>
             <a:fld id="{DA392747-C1F4-424F-BAB1-CC63944BFCAA}" type="datetimeFigureOut">
               <a:rPr lang="en-US" smtClean="0"/>
-              <a:t>6/14/20</a:t>
+              <a:t>6/15/20</a:t>
             </a:fld>
             <a:endParaRPr lang="en-US"/>
           </a:p>
@@ -3858,7 +3858,7 @@
           <a:p>
             <a:fld id="{DA392747-C1F4-424F-BAB1-CC63944BFCAA}" type="datetimeFigureOut">
               <a:rPr lang="en-US" smtClean="0"/>
-              <a:t>6/14/20</a:t>
+              <a:t>6/15/20</a:t>
             </a:fld>
             <a:endParaRPr lang="en-US"/>
           </a:p>
@@ -4300,7 +4300,7 @@
           <a:p>
             <a:fld id="{DA392747-C1F4-424F-BAB1-CC63944BFCAA}" type="datetimeFigureOut">
               <a:rPr lang="en-US" smtClean="0"/>
-              <a:t>6/14/20</a:t>
+              <a:t>6/15/20</a:t>
             </a:fld>
             <a:endParaRPr lang="en-US"/>
           </a:p>
@@ -4418,7 +4418,7 @@
           <a:p>
             <a:fld id="{DA392747-C1F4-424F-BAB1-CC63944BFCAA}" type="datetimeFigureOut">
               <a:rPr lang="en-US" smtClean="0"/>
-              <a:t>6/14/20</a:t>
+              <a:t>6/15/20</a:t>
             </a:fld>
             <a:endParaRPr lang="en-US"/>
           </a:p>
@@ -4513,7 +4513,7 @@
           <a:p>
             <a:fld id="{DA392747-C1F4-424F-BAB1-CC63944BFCAA}" type="datetimeFigureOut">
               <a:rPr lang="en-US" smtClean="0"/>
-              <a:t>6/14/20</a:t>
+              <a:t>6/15/20</a:t>
             </a:fld>
             <a:endParaRPr lang="en-US"/>
           </a:p>
@@ -4796,7 +4796,7 @@
           <a:p>
             <a:fld id="{DA392747-C1F4-424F-BAB1-CC63944BFCAA}" type="datetimeFigureOut">
               <a:rPr lang="en-US" smtClean="0"/>
-              <a:t>6/14/20</a:t>
+              <a:t>6/15/20</a:t>
             </a:fld>
             <a:endParaRPr lang="en-US"/>
           </a:p>
@@ -5087,7 +5087,7 @@
           <a:p>
             <a:fld id="{DA392747-C1F4-424F-BAB1-CC63944BFCAA}" type="datetimeFigureOut">
               <a:rPr lang="en-US" smtClean="0"/>
-              <a:t>6/14/20</a:t>
+              <a:t>6/15/20</a:t>
             </a:fld>
             <a:endParaRPr lang="en-US"/>
           </a:p>
@@ -5617,7 +5617,7 @@
           <a:p>
             <a:fld id="{DA392747-C1F4-424F-BAB1-CC63944BFCAA}" type="datetimeFigureOut">
               <a:rPr lang="en-US" smtClean="0"/>
-              <a:t>6/14/20</a:t>
+              <a:t>6/15/20</a:t>
             </a:fld>
             <a:endParaRPr lang="en-US"/>
           </a:p>
@@ -7378,11 +7378,11 @@
             </a:pPr>
             <a:r>
               <a:rPr lang="pt-BR" dirty="0"/>
-              <a:t>Através da nossa </a:t>
+              <a:t>Através da rede </a:t>
             </a:r>
             <a:r>
               <a:rPr lang="pt-BR" dirty="0" err="1"/>
-              <a:t>BlockChain</a:t>
+              <a:t>ethereum</a:t>
             </a:r>
             <a:r>
               <a:rPr lang="pt-BR" dirty="0"/>
@@ -7940,11 +7940,11 @@
             </a:r>
             <a:r>
               <a:rPr lang="pt-BR" dirty="0"/>
-              <a:t> a empresa ou pessoa que deseja realizar o IPO do seu negócio pode clonar nosso contrato e submete-lo a nossa </a:t>
+              <a:t> a empresa ou pessoa que deseja realizar o IPO do seu negócio pode clonar nosso contrato e submete-lo a na rede </a:t>
             </a:r>
             <a:r>
               <a:rPr lang="pt-BR" dirty="0" err="1"/>
-              <a:t>BlockChain</a:t>
+              <a:t>ethereum</a:t>
             </a:r>
             <a:r>
               <a:rPr lang="pt-BR" dirty="0"/>

</xml_diff>